<commit_message>
Build site at 2022-08-19 14:48:00 UTC
</commit_message>
<xml_diff>
--- a/_site/pages/usage_examples/uses_pitch.pptx
+++ b/_site/pages/usage_examples/uses_pitch.pptx
@@ -5,7 +5,7 @@
     <p:sldMasterId id="2147483648" r:id="rId1"/>
   </p:sldMasterIdLst>
   <p:notesMasterIdLst>
-    <p:notesMasterId r:id="rId16"/>
+    <p:notesMasterId r:id="rId17"/>
   </p:notesMasterIdLst>
   <p:sldIdLst>
     <p:sldId id="257" r:id="rId2"/>
@@ -22,6 +22,7 @@
     <p:sldId id="268" r:id="rId13"/>
     <p:sldId id="266" r:id="rId14"/>
     <p:sldId id="267" r:id="rId15"/>
+    <p:sldId id="271" r:id="rId16"/>
   </p:sldIdLst>
   <p:sldSz cx="12192000" cy="6858000"/>
   <p:notesSz cx="6858000" cy="9144000"/>
@@ -210,7 +211,7 @@
           <a:p>
             <a:fld id="{2CD01EFD-C897-2F4F-A8C4-BBFE9586ADD6}" type="datetimeFigureOut">
               <a:rPr lang="en-GB" smtClean="0"/>
-              <a:t>17/08/2022</a:t>
+              <a:t>19/08/2022</a:t>
             </a:fld>
             <a:endParaRPr lang="en-GB"/>
           </a:p>
@@ -1172,6 +1173,94 @@
 </p:notes>
 </file>
 
+<file path=ppt/notesSlides/notesSlide15.xml><?xml version="1.0" encoding="utf-8"?>
+<p:notes xmlns:a="http://schemas.openxmlformats.org/drawingml/2006/main" xmlns:r="http://schemas.openxmlformats.org/officeDocument/2006/relationships" xmlns:p="http://schemas.openxmlformats.org/presentationml/2006/main">
+  <p:cSld>
+    <p:spTree>
+      <p:nvGrpSpPr>
+        <p:cNvPr id="1" name=""/>
+        <p:cNvGrpSpPr/>
+        <p:nvPr/>
+      </p:nvGrpSpPr>
+      <p:grpSpPr>
+        <a:xfrm>
+          <a:off x="0" y="0"/>
+          <a:ext cx="0" cy="0"/>
+          <a:chOff x="0" y="0"/>
+          <a:chExt cx="0" cy="0"/>
+        </a:xfrm>
+      </p:grpSpPr>
+      <p:sp>
+        <p:nvSpPr>
+          <p:cNvPr id="2" name="Slide Image Placeholder 1"/>
+          <p:cNvSpPr>
+            <a:spLocks noGrp="1" noRot="1" noChangeAspect="1"/>
+          </p:cNvSpPr>
+          <p:nvPr>
+            <p:ph type="sldImg"/>
+          </p:nvPr>
+        </p:nvSpPr>
+        <p:spPr/>
+      </p:sp>
+      <p:sp>
+        <p:nvSpPr>
+          <p:cNvPr id="3" name="Notes Placeholder 2"/>
+          <p:cNvSpPr>
+            <a:spLocks noGrp="1"/>
+          </p:cNvSpPr>
+          <p:nvPr>
+            <p:ph type="body" idx="1"/>
+          </p:nvPr>
+        </p:nvSpPr>
+        <p:spPr/>
+        <p:txBody>
+          <a:bodyPr/>
+          <a:lstStyle/>
+          <a:p>
+            <a:pPr marL="342900" indent="-342900">
+              <a:buFont typeface="Arial" panose="020B0604020202020204" pitchFamily="34" charset="0"/>
+              <a:buChar char="•"/>
+            </a:pPr>
+            <a:endParaRPr lang="en-GB" sz="2000" dirty="0"/>
+          </a:p>
+        </p:txBody>
+      </p:sp>
+      <p:sp>
+        <p:nvSpPr>
+          <p:cNvPr id="4" name="Slide Number Placeholder 3"/>
+          <p:cNvSpPr>
+            <a:spLocks noGrp="1"/>
+          </p:cNvSpPr>
+          <p:nvPr>
+            <p:ph type="sldNum" sz="quarter" idx="5"/>
+          </p:nvPr>
+        </p:nvSpPr>
+        <p:spPr/>
+        <p:txBody>
+          <a:bodyPr/>
+          <a:lstStyle/>
+          <a:p>
+            <a:fld id="{D03B494D-EF55-ED4D-8344-BA5F1AFFB3B7}" type="slidenum">
+              <a:rPr lang="en-GB" smtClean="0"/>
+              <a:t>15</a:t>
+            </a:fld>
+            <a:endParaRPr lang="en-GB"/>
+          </a:p>
+        </p:txBody>
+      </p:sp>
+    </p:spTree>
+    <p:extLst>
+      <p:ext uri="{BB962C8B-B14F-4D97-AF65-F5344CB8AC3E}">
+        <p14:creationId xmlns:p14="http://schemas.microsoft.com/office/powerpoint/2010/main" val="4214673098"/>
+      </p:ext>
+    </p:extLst>
+  </p:cSld>
+  <p:clrMapOvr>
+    <a:masterClrMapping/>
+  </p:clrMapOvr>
+</p:notes>
+</file>
+
 <file path=ppt/notesSlides/notesSlide2.xml><?xml version="1.0" encoding="utf-8"?>
 <p:notes xmlns:a="http://schemas.openxmlformats.org/drawingml/2006/main" xmlns:r="http://schemas.openxmlformats.org/officeDocument/2006/relationships" xmlns:p="http://schemas.openxmlformats.org/presentationml/2006/main">
   <p:cSld>
@@ -2446,7 +2535,7 @@
           <a:p>
             <a:fld id="{44F1775B-48C8-5541-8AC4-CC7C20C09602}" type="datetimeFigureOut">
               <a:rPr lang="en-GB" smtClean="0"/>
-              <a:t>17/08/2022</a:t>
+              <a:t>19/08/2022</a:t>
             </a:fld>
             <a:endParaRPr lang="en-GB"/>
           </a:p>
@@ -2646,7 +2735,7 @@
           <a:p>
             <a:fld id="{44F1775B-48C8-5541-8AC4-CC7C20C09602}" type="datetimeFigureOut">
               <a:rPr lang="en-GB" smtClean="0"/>
-              <a:t>17/08/2022</a:t>
+              <a:t>19/08/2022</a:t>
             </a:fld>
             <a:endParaRPr lang="en-GB"/>
           </a:p>
@@ -2856,7 +2945,7 @@
           <a:p>
             <a:fld id="{44F1775B-48C8-5541-8AC4-CC7C20C09602}" type="datetimeFigureOut">
               <a:rPr lang="en-GB" smtClean="0"/>
-              <a:t>17/08/2022</a:t>
+              <a:t>19/08/2022</a:t>
             </a:fld>
             <a:endParaRPr lang="en-GB"/>
           </a:p>
@@ -3056,7 +3145,7 @@
           <a:p>
             <a:fld id="{44F1775B-48C8-5541-8AC4-CC7C20C09602}" type="datetimeFigureOut">
               <a:rPr lang="en-GB" smtClean="0"/>
-              <a:t>17/08/2022</a:t>
+              <a:t>19/08/2022</a:t>
             </a:fld>
             <a:endParaRPr lang="en-GB"/>
           </a:p>
@@ -3332,7 +3421,7 @@
           <a:p>
             <a:fld id="{44F1775B-48C8-5541-8AC4-CC7C20C09602}" type="datetimeFigureOut">
               <a:rPr lang="en-GB" smtClean="0"/>
-              <a:t>17/08/2022</a:t>
+              <a:t>19/08/2022</a:t>
             </a:fld>
             <a:endParaRPr lang="en-GB"/>
           </a:p>
@@ -3600,7 +3689,7 @@
           <a:p>
             <a:fld id="{44F1775B-48C8-5541-8AC4-CC7C20C09602}" type="datetimeFigureOut">
               <a:rPr lang="en-GB" smtClean="0"/>
-              <a:t>17/08/2022</a:t>
+              <a:t>19/08/2022</a:t>
             </a:fld>
             <a:endParaRPr lang="en-GB"/>
           </a:p>
@@ -4015,7 +4104,7 @@
           <a:p>
             <a:fld id="{44F1775B-48C8-5541-8AC4-CC7C20C09602}" type="datetimeFigureOut">
               <a:rPr lang="en-GB" smtClean="0"/>
-              <a:t>17/08/2022</a:t>
+              <a:t>19/08/2022</a:t>
             </a:fld>
             <a:endParaRPr lang="en-GB"/>
           </a:p>
@@ -4157,7 +4246,7 @@
           <a:p>
             <a:fld id="{44F1775B-48C8-5541-8AC4-CC7C20C09602}" type="datetimeFigureOut">
               <a:rPr lang="en-GB" smtClean="0"/>
-              <a:t>17/08/2022</a:t>
+              <a:t>19/08/2022</a:t>
             </a:fld>
             <a:endParaRPr lang="en-GB"/>
           </a:p>
@@ -4270,7 +4359,7 @@
           <a:p>
             <a:fld id="{44F1775B-48C8-5541-8AC4-CC7C20C09602}" type="datetimeFigureOut">
               <a:rPr lang="en-GB" smtClean="0"/>
-              <a:t>17/08/2022</a:t>
+              <a:t>19/08/2022</a:t>
             </a:fld>
             <a:endParaRPr lang="en-GB"/>
           </a:p>
@@ -4583,7 +4672,7 @@
           <a:p>
             <a:fld id="{44F1775B-48C8-5541-8AC4-CC7C20C09602}" type="datetimeFigureOut">
               <a:rPr lang="en-GB" smtClean="0"/>
-              <a:t>17/08/2022</a:t>
+              <a:t>19/08/2022</a:t>
             </a:fld>
             <a:endParaRPr lang="en-GB"/>
           </a:p>
@@ -4872,7 +4961,7 @@
           <a:p>
             <a:fld id="{44F1775B-48C8-5541-8AC4-CC7C20C09602}" type="datetimeFigureOut">
               <a:rPr lang="en-GB" smtClean="0"/>
-              <a:t>17/08/2022</a:t>
+              <a:t>19/08/2022</a:t>
             </a:fld>
             <a:endParaRPr lang="en-GB"/>
           </a:p>
@@ -5115,7 +5204,7 @@
           <a:p>
             <a:fld id="{44F1775B-48C8-5541-8AC4-CC7C20C09602}" type="datetimeFigureOut">
               <a:rPr lang="en-GB" smtClean="0"/>
-              <a:t>17/08/2022</a:t>
+              <a:t>19/08/2022</a:t>
             </a:fld>
             <a:endParaRPr lang="en-GB"/>
           </a:p>
@@ -5518,6 +5607,14 @@
 <file path=ppt/slides/slide1.xml><?xml version="1.0" encoding="utf-8"?>
 <p:sld xmlns:a="http://schemas.openxmlformats.org/drawingml/2006/main" xmlns:r="http://schemas.openxmlformats.org/officeDocument/2006/relationships" xmlns:p="http://schemas.openxmlformats.org/presentationml/2006/main">
   <p:cSld>
+    <p:bg>
+      <p:bgPr>
+        <a:solidFill>
+          <a:schemeClr val="bg1"/>
+        </a:solidFill>
+        <a:effectLst/>
+      </p:bgPr>
+    </p:bg>
     <p:spTree>
       <p:nvGrpSpPr>
         <p:cNvPr id="1" name=""/>
@@ -5532,12 +5629,158 @@
           <a:chExt cx="0" cy="0"/>
         </a:xfrm>
       </p:grpSpPr>
-      <p:sp>
-        <p:nvSpPr>
-          <p:cNvPr id="3" name="TextBox 2">
+      <p:sp useBgFill="1">
+        <p:nvSpPr>
+          <p:cNvPr id="9" name="Rectangle 8">
             <a:extLst>
               <a:ext uri="{FF2B5EF4-FFF2-40B4-BE49-F238E27FC236}">
-                <a16:creationId xmlns:a16="http://schemas.microsoft.com/office/drawing/2014/main" id="{B6D9F9F8-50E6-6946-AFF4-72123E928680}"/>
+                <a16:creationId xmlns:a16="http://schemas.microsoft.com/office/drawing/2014/main" id="{04812C46-200A-4DEB-A05E-3ED6C68C2387}"/>
+              </a:ext>
+              <a:ext uri="{C183D7F6-B498-43B3-948B-1728B52AA6E4}">
+                <adec:decorative xmlns:adec="http://schemas.microsoft.com/office/drawing/2017/decorative" val="1"/>
+              </a:ext>
+            </a:extLst>
+          </p:cNvPr>
+          <p:cNvSpPr>
+            <a:spLocks noGrp="1" noRot="1" noChangeAspect="1" noMove="1" noResize="1" noEditPoints="1" noAdjustHandles="1" noChangeArrowheads="1" noChangeShapeType="1" noTextEdit="1"/>
+          </p:cNvSpPr>
+          <p:nvPr>
+            <p:extLst>
+              <p:ext uri="{386F3935-93C4-4BCD-93E2-E3B085C9AB24}">
+                <p16:designElem xmlns:p16="http://schemas.microsoft.com/office/powerpoint/2015/main" val="1"/>
+              </p:ext>
+            </p:extLst>
+          </p:nvPr>
+        </p:nvSpPr>
+        <p:spPr>
+          <a:xfrm>
+            <a:off x="-1" y="0"/>
+            <a:ext cx="12188952" cy="6858000"/>
+          </a:xfrm>
+          <a:prstGeom prst="rect">
+            <a:avLst/>
+          </a:prstGeom>
+          <a:ln>
+            <a:noFill/>
+          </a:ln>
+        </p:spPr>
+        <p:style>
+          <a:lnRef idx="2">
+            <a:schemeClr val="accent1">
+              <a:shade val="50000"/>
+            </a:schemeClr>
+          </a:lnRef>
+          <a:fillRef idx="1">
+            <a:schemeClr val="accent1"/>
+          </a:fillRef>
+          <a:effectRef idx="0">
+            <a:schemeClr val="accent1"/>
+          </a:effectRef>
+          <a:fontRef idx="minor">
+            <a:schemeClr val="lt1"/>
+          </a:fontRef>
+        </p:style>
+        <p:txBody>
+          <a:bodyPr rtlCol="0" anchor="ctr"/>
+          <a:lstStyle/>
+          <a:p>
+            <a:pPr algn="ctr"/>
+            <a:endParaRPr lang="en-US"/>
+          </a:p>
+        </p:txBody>
+      </p:sp>
+      <p:sp>
+        <p:nvSpPr>
+          <p:cNvPr id="11" name="Rectangle 10">
+            <a:extLst>
+              <a:ext uri="{FF2B5EF4-FFF2-40B4-BE49-F238E27FC236}">
+                <a16:creationId xmlns:a16="http://schemas.microsoft.com/office/drawing/2014/main" id="{D1EA859B-E555-4109-94F3-6700E046E008}"/>
+              </a:ext>
+              <a:ext uri="{C183D7F6-B498-43B3-948B-1728B52AA6E4}">
+                <adec:decorative xmlns:adec="http://schemas.microsoft.com/office/drawing/2017/decorative" val="1"/>
+              </a:ext>
+            </a:extLst>
+          </p:cNvPr>
+          <p:cNvSpPr>
+            <a:spLocks noGrp="1" noRot="1" noChangeAspect="1" noMove="1" noResize="1" noEditPoints="1" noAdjustHandles="1" noChangeArrowheads="1" noChangeShapeType="1" noTextEdit="1"/>
+          </p:cNvSpPr>
+          <p:nvPr>
+            <p:extLst>
+              <p:ext uri="{386F3935-93C4-4BCD-93E2-E3B085C9AB24}">
+                <p16:designElem xmlns:p16="http://schemas.microsoft.com/office/powerpoint/2015/main" val="1"/>
+              </p:ext>
+            </p:extLst>
+          </p:nvPr>
+        </p:nvSpPr>
+        <p:spPr>
+          <a:xfrm flipH="1">
+            <a:off x="5125019" y="0"/>
+            <a:ext cx="7066978" cy="6858000"/>
+          </a:xfrm>
+          <a:prstGeom prst="rect">
+            <a:avLst/>
+          </a:prstGeom>
+          <a:gradFill>
+            <a:gsLst>
+              <a:gs pos="48000">
+                <a:schemeClr val="bg1"/>
+              </a:gs>
+              <a:gs pos="35000">
+                <a:schemeClr val="bg1">
+                  <a:alpha val="77000"/>
+                </a:schemeClr>
+              </a:gs>
+              <a:gs pos="19000">
+                <a:schemeClr val="bg1">
+                  <a:alpha val="38000"/>
+                </a:schemeClr>
+              </a:gs>
+              <a:gs pos="0">
+                <a:schemeClr val="bg1">
+                  <a:alpha val="0"/>
+                </a:schemeClr>
+              </a:gs>
+              <a:gs pos="100000">
+                <a:schemeClr val="bg1"/>
+              </a:gs>
+            </a:gsLst>
+            <a:lin ang="10800000" scaled="0"/>
+          </a:gradFill>
+          <a:ln>
+            <a:noFill/>
+          </a:ln>
+        </p:spPr>
+        <p:style>
+          <a:lnRef idx="2">
+            <a:schemeClr val="accent1">
+              <a:shade val="50000"/>
+            </a:schemeClr>
+          </a:lnRef>
+          <a:fillRef idx="1">
+            <a:schemeClr val="accent1"/>
+          </a:fillRef>
+          <a:effectRef idx="0">
+            <a:schemeClr val="accent1"/>
+          </a:effectRef>
+          <a:fontRef idx="minor">
+            <a:schemeClr val="lt1"/>
+          </a:fontRef>
+        </p:style>
+        <p:txBody>
+          <a:bodyPr rtlCol="0" anchor="ctr"/>
+          <a:lstStyle/>
+          <a:p>
+            <a:pPr algn="ctr"/>
+            <a:endParaRPr lang="en-US" dirty="0"/>
+          </a:p>
+        </p:txBody>
+      </p:sp>
+      <p:sp>
+        <p:nvSpPr>
+          <p:cNvPr id="7" name="TextBox 6">
+            <a:extLst>
+              <a:ext uri="{FF2B5EF4-FFF2-40B4-BE49-F238E27FC236}">
+                <a16:creationId xmlns:a16="http://schemas.microsoft.com/office/drawing/2014/main" id="{46DCF492-D273-AB44-8F37-99DD0E4FDD5A}"/>
               </a:ext>
             </a:extLst>
           </p:cNvPr>
@@ -5546,7 +5789,7 @@
         </p:nvSpPr>
         <p:spPr>
           <a:xfrm>
-            <a:off x="3084096" y="3167390"/>
+            <a:off x="3082571" y="3167390"/>
             <a:ext cx="6023807" cy="523220"/>
           </a:xfrm>
           <a:prstGeom prst="rect">
@@ -5570,6 +5813,36 @@
           </a:p>
         </p:txBody>
       </p:sp>
+      <p:pic>
+        <p:nvPicPr>
+          <p:cNvPr id="8" name="Picture 7" descr="Shape&#10;&#10;Description automatically generated with low confidence">
+            <a:extLst>
+              <a:ext uri="{FF2B5EF4-FFF2-40B4-BE49-F238E27FC236}">
+                <a16:creationId xmlns:a16="http://schemas.microsoft.com/office/drawing/2014/main" id="{5CC95095-3C9B-AE41-A176-F7EAA1D14358}"/>
+              </a:ext>
+            </a:extLst>
+          </p:cNvPr>
+          <p:cNvPicPr>
+            <a:picLocks noChangeAspect="1"/>
+          </p:cNvPicPr>
+          <p:nvPr/>
+        </p:nvPicPr>
+        <p:blipFill>
+          <a:blip r:embed="rId3"/>
+          <a:stretch>
+            <a:fillRect/>
+          </a:stretch>
+        </p:blipFill>
+        <p:spPr>
+          <a:xfrm>
+            <a:off x="3794511" y="2952427"/>
+            <a:ext cx="618568" cy="953146"/>
+          </a:xfrm>
+          <a:prstGeom prst="rect">
+            <a:avLst/>
+          </a:prstGeom>
+        </p:spPr>
+      </p:pic>
     </p:spTree>
     <p:extLst>
       <p:ext uri="{BB962C8B-B14F-4D97-AF65-F5344CB8AC3E}">
@@ -5809,10 +6082,10 @@
         </p:nvGrpSpPr>
         <p:grpSpPr>
           <a:xfrm>
-            <a:off x="1228806" y="442228"/>
-            <a:ext cx="9727846" cy="1333196"/>
-            <a:chOff x="1228806" y="5193514"/>
-            <a:chExt cx="9727846" cy="1333196"/>
+            <a:off x="1170085" y="984669"/>
+            <a:ext cx="9851830" cy="1333196"/>
+            <a:chOff x="1166814" y="5193514"/>
+            <a:chExt cx="9851830" cy="1333196"/>
           </a:xfrm>
         </p:grpSpPr>
         <p:sp>
@@ -5829,7 +6102,7 @@
           </p:nvSpPr>
           <p:spPr>
             <a:xfrm rot="5400000" flipV="1">
-              <a:off x="1246806" y="5176710"/>
+              <a:off x="1184814" y="5176710"/>
               <a:ext cx="1332000" cy="1368000"/>
             </a:xfrm>
             <a:prstGeom prst="bentArrow">
@@ -5885,7 +6158,7 @@
           </p:nvSpPr>
           <p:spPr>
             <a:xfrm rot="16200000" flipH="1" flipV="1">
-              <a:off x="9606652" y="5176710"/>
+              <a:off x="9668644" y="5176710"/>
               <a:ext cx="1332000" cy="1368000"/>
             </a:xfrm>
             <a:prstGeom prst="bentArrow">
@@ -6026,7 +6299,7 @@
         </p:nvGrpSpPr>
         <p:grpSpPr>
           <a:xfrm>
-            <a:off x="2596806" y="836945"/>
+            <a:off x="2600077" y="1379386"/>
             <a:ext cx="6985050" cy="4655474"/>
             <a:chOff x="2596806" y="-5918471"/>
             <a:chExt cx="6985050" cy="4655474"/>
@@ -6060,9 +6333,7 @@
               <a:avLst/>
             </a:prstGeom>
             <a:ln w="12700">
-              <a:solidFill>
-                <a:schemeClr val="tx1"/>
-              </a:solidFill>
+              <a:noFill/>
             </a:ln>
           </p:spPr>
         </p:pic>
@@ -8079,6 +8350,66 @@
 </p:sld>
 </file>
 
+<file path=ppt/slides/slide15.xml><?xml version="1.0" encoding="utf-8"?>
+<p:sld xmlns:a="http://schemas.openxmlformats.org/drawingml/2006/main" xmlns:r="http://schemas.openxmlformats.org/officeDocument/2006/relationships" xmlns:p="http://schemas.openxmlformats.org/presentationml/2006/main">
+  <p:cSld>
+    <p:spTree>
+      <p:nvGrpSpPr>
+        <p:cNvPr id="1" name=""/>
+        <p:cNvGrpSpPr/>
+        <p:nvPr/>
+      </p:nvGrpSpPr>
+      <p:grpSpPr>
+        <a:xfrm>
+          <a:off x="0" y="0"/>
+          <a:ext cx="0" cy="0"/>
+          <a:chOff x="0" y="0"/>
+          <a:chExt cx="0" cy="0"/>
+        </a:xfrm>
+      </p:grpSpPr>
+      <p:pic>
+        <p:nvPicPr>
+          <p:cNvPr id="8" name="Picture 7" descr="Shape&#10;&#10;Description automatically generated with low confidence">
+            <a:extLst>
+              <a:ext uri="{FF2B5EF4-FFF2-40B4-BE49-F238E27FC236}">
+                <a16:creationId xmlns:a16="http://schemas.microsoft.com/office/drawing/2014/main" id="{5CC95095-3C9B-AE41-A176-F7EAA1D14358}"/>
+              </a:ext>
+            </a:extLst>
+          </p:cNvPr>
+          <p:cNvPicPr>
+            <a:picLocks noChangeAspect="1"/>
+          </p:cNvPicPr>
+          <p:nvPr/>
+        </p:nvPicPr>
+        <p:blipFill>
+          <a:blip r:embed="rId3"/>
+          <a:stretch>
+            <a:fillRect/>
+          </a:stretch>
+        </p:blipFill>
+        <p:spPr>
+          <a:xfrm>
+            <a:off x="5786716" y="2952427"/>
+            <a:ext cx="618568" cy="953146"/>
+          </a:xfrm>
+          <a:prstGeom prst="rect">
+            <a:avLst/>
+          </a:prstGeom>
+        </p:spPr>
+      </p:pic>
+    </p:spTree>
+    <p:extLst>
+      <p:ext uri="{BB962C8B-B14F-4D97-AF65-F5344CB8AC3E}">
+        <p14:creationId xmlns:p14="http://schemas.microsoft.com/office/powerpoint/2010/main" val="3113165657"/>
+      </p:ext>
+    </p:extLst>
+  </p:cSld>
+  <p:clrMapOvr>
+    <a:masterClrMapping/>
+  </p:clrMapOvr>
+</p:sld>
+</file>
+
 <file path=ppt/slides/slide2.xml><?xml version="1.0" encoding="utf-8"?>
 <p:sld xmlns:a="http://schemas.openxmlformats.org/drawingml/2006/main" xmlns:r="http://schemas.openxmlformats.org/officeDocument/2006/relationships" xmlns:p="http://schemas.openxmlformats.org/presentationml/2006/main">
   <p:cSld>
@@ -8149,6 +8480,47 @@
           </a:p>
         </p:txBody>
       </p:sp>
+      <p:cxnSp>
+        <p:nvCxnSpPr>
+          <p:cNvPr id="3" name="Straight Connector 2">
+            <a:extLst>
+              <a:ext uri="{FF2B5EF4-FFF2-40B4-BE49-F238E27FC236}">
+                <a16:creationId xmlns:a16="http://schemas.microsoft.com/office/drawing/2014/main" id="{DB1DA058-99D0-044B-AE8A-AC2EB8664529}"/>
+              </a:ext>
+            </a:extLst>
+          </p:cNvPr>
+          <p:cNvCxnSpPr/>
+          <p:nvPr/>
+        </p:nvCxnSpPr>
+        <p:spPr>
+          <a:xfrm flipH="1">
+            <a:off x="4572001" y="3890074"/>
+            <a:ext cx="3037668" cy="0"/>
+          </a:xfrm>
+          <a:prstGeom prst="line">
+            <a:avLst/>
+          </a:prstGeom>
+          <a:ln>
+            <a:solidFill>
+              <a:srgbClr val="C00000"/>
+            </a:solidFill>
+          </a:ln>
+        </p:spPr>
+        <p:style>
+          <a:lnRef idx="1">
+            <a:schemeClr val="accent1"/>
+          </a:lnRef>
+          <a:fillRef idx="0">
+            <a:schemeClr val="accent1"/>
+          </a:fillRef>
+          <a:effectRef idx="0">
+            <a:schemeClr val="accent1"/>
+          </a:effectRef>
+          <a:fontRef idx="minor">
+            <a:schemeClr val="tx1"/>
+          </a:fontRef>
+        </p:style>
+      </p:cxnSp>
     </p:spTree>
     <p:extLst>
       <p:ext uri="{BB962C8B-B14F-4D97-AF65-F5344CB8AC3E}">
@@ -8304,7 +8676,7 @@
               <a:rPr lang="en-GB" sz="2800" dirty="0">
                 <a:latin typeface="Satoshi" pitchFamily="2" charset="77"/>
               </a:rPr>
-              <a:t>How can I trust medicine from an AI algorithm?</a:t>
+              <a:t>How can I trust medicine from an algorithm?</a:t>
             </a:r>
           </a:p>
         </p:txBody>
@@ -8411,8 +8783,8 @@
         </p:blipFill>
         <p:spPr>
           <a:xfrm>
-            <a:off x="2813050" y="127358"/>
-            <a:ext cx="6565900" cy="4584700"/>
+            <a:off x="3387724" y="521603"/>
+            <a:ext cx="5416551" cy="3782157"/>
           </a:xfrm>
           <a:prstGeom prst="rect">
             <a:avLst/>
@@ -8433,7 +8805,7 @@
         </p:nvSpPr>
         <p:spPr>
           <a:xfrm>
-            <a:off x="2813050" y="4527392"/>
+            <a:off x="3434218" y="4088098"/>
             <a:ext cx="6096000" cy="369332"/>
           </a:xfrm>
           <a:prstGeom prst="rect">
@@ -8482,7 +8854,7 @@
         </p:nvSpPr>
         <p:spPr>
           <a:xfrm>
-            <a:off x="2813049" y="5380672"/>
+            <a:off x="3434218" y="5136068"/>
             <a:ext cx="6096001" cy="1200329"/>
           </a:xfrm>
           <a:prstGeom prst="rect">
@@ -8656,6 +9028,43 @@
                 <a:latin typeface="Satoshi" pitchFamily="2" charset="77"/>
               </a:rPr>
               <a:t>existing scientific evidence.</a:t>
+            </a:r>
+          </a:p>
+        </p:txBody>
+      </p:sp>
+      <p:sp>
+        <p:nvSpPr>
+          <p:cNvPr id="4" name="TextBox 3">
+            <a:extLst>
+              <a:ext uri="{FF2B5EF4-FFF2-40B4-BE49-F238E27FC236}">
+                <a16:creationId xmlns:a16="http://schemas.microsoft.com/office/drawing/2014/main" id="{58C2B578-F09E-8243-AB6E-CB5901805F1D}"/>
+              </a:ext>
+            </a:extLst>
+          </p:cNvPr>
+          <p:cNvSpPr txBox="1"/>
+          <p:nvPr/>
+        </p:nvSpPr>
+        <p:spPr>
+          <a:xfrm>
+            <a:off x="10272885" y="0"/>
+            <a:ext cx="1919115" cy="523220"/>
+          </a:xfrm>
+          <a:prstGeom prst="rect">
+            <a:avLst/>
+          </a:prstGeom>
+          <a:noFill/>
+        </p:spPr>
+        <p:txBody>
+          <a:bodyPr wrap="none" rtlCol="0">
+            <a:spAutoFit/>
+          </a:bodyPr>
+          <a:lstStyle/>
+          <a:p>
+            <a:r>
+              <a:rPr lang="en-GB" sz="2800" dirty="0">
+                <a:latin typeface="Satoshi" pitchFamily="2" charset="77"/>
+              </a:rPr>
+              <a:t>Case study</a:t>
             </a:r>
           </a:p>
         </p:txBody>

</xml_diff>